<commit_message>
bug fixes, code cleaning, little changes
Finally fixed bug that was making it to where you couldn't edit an event from day view. Also cleaned up the code by removing commented out code. Made litle changes to the gui as well
</commit_message>
<xml_diff>
--- a/Team-1.pptx
+++ b/Team-1.pptx
@@ -3954,13 +3954,18 @@
           <a:p>
             <a:r>
               <a:rPr lang="en-US" dirty="0"/>
-              <a:t>Alex</a:t>
-            </a:r>
+              <a:t>Alex </a:t>
+            </a:r>
+            <a:r>
+              <a:rPr lang="en-US" dirty="0" err="1"/>
+              <a:t>Wimer</a:t>
+            </a:r>
+            <a:endParaRPr lang="en-US" dirty="0"/>
           </a:p>
           <a:p>
             <a:r>
               <a:rPr lang="en-US" dirty="0"/>
-              <a:t>Conner</a:t>
+              <a:t>Connor Mahaffey</a:t>
             </a:r>
           </a:p>
           <a:p>

</xml_diff>